<commit_message>
OfficeAddins - Module 5: FY2019Q2 Quarterly refresh (#567)
* FY2019Q2 content refresh

- significant changes to Angular lab exercise
- known issues with the React sample... all documented and confirmed by MSFT here: https://github.com/OfficeDev/generator-office/issues/389

The steps in the lab work, but users will run into issues until the generator is fixed

* addressing reviewer feedback
</commit_message>
<xml_diff>
--- a/OfficeAddin/05 Using modern JavaScript/02 Build an Office Add-in using Angular.pptx
+++ b/OfficeAddin/05 Using modern JavaScript/02 Build an Office Add-in using Angular.pptx
@@ -267,7 +267,7 @@
               <a:rPr lang="en-US" smtClean="0">
                 <a:latin typeface="Segoe UI" pitchFamily="34" charset="0"/>
               </a:rPr>
-              <a:t>9/17/18 8:54 PM</a:t>
+              <a:t>12/12/18 2:15 PM</a:t>
             </a:fld>
             <a:endParaRPr lang="en-US" dirty="0">
               <a:latin typeface="Segoe UI" pitchFamily="34" charset="0"/>
@@ -561,7 +561,7 @@
           <a:p>
             <a:fld id="{D18B56EA-E28F-4F92-9F16-7A6F2501B303}" type="datetime8">
               <a:rPr lang="en-US" smtClean="0"/>
-              <a:t>9/17/18 8:54 PM</a:t>
+              <a:t>12/12/18 2:15 PM</a:t>
             </a:fld>
             <a:endParaRPr lang="en-US" dirty="0"/>
           </a:p>
@@ -1049,7 +1049,7 @@
                 <a:tabLst/>
                 <a:defRPr/>
               </a:pPr>
-              <a:t>9/17/18 8:54 PM</a:t>
+              <a:t>12/12/18 2:15 PM</a:t>
             </a:fld>
             <a:endParaRPr kumimoji="0" lang="en-US" sz="1200" b="0" i="0" u="none" strike="noStrike" kern="1200" cap="none" spc="0" normalizeH="0" baseline="0" noProof="0" dirty="0">
               <a:ln>
@@ -2071,7 +2071,7 @@
           <a:p>
             <a:fld id="{D18B56EA-E28F-4F92-9F16-7A6F2501B303}" type="datetime8">
               <a:rPr lang="en-US" smtClean="0"/>
-              <a:t>9/17/18 8:54 PM</a:t>
+              <a:t>12/12/18 2:15 PM</a:t>
             </a:fld>
             <a:endParaRPr lang="en-US" dirty="0"/>
           </a:p>
@@ -2252,7 +2252,7 @@
           <a:p>
             <a:fld id="{D18B56EA-E28F-4F92-9F16-7A6F2501B303}" type="datetime8">
               <a:rPr lang="en-US" smtClean="0"/>
-              <a:t>9/17/18 8:54 PM</a:t>
+              <a:t>12/12/18 2:15 PM</a:t>
             </a:fld>
             <a:endParaRPr lang="en-US" dirty="0"/>
           </a:p>
@@ -2433,7 +2433,7 @@
           <a:p>
             <a:fld id="{D18B56EA-E28F-4F92-9F16-7A6F2501B303}" type="datetime8">
               <a:rPr lang="en-US" smtClean="0"/>
-              <a:t>9/17/18 8:54 PM</a:t>
+              <a:t>12/12/18 2:15 PM</a:t>
             </a:fld>
             <a:endParaRPr lang="en-US" dirty="0"/>
           </a:p>
@@ -2614,7 +2614,7 @@
           <a:p>
             <a:fld id="{D18B56EA-E28F-4F92-9F16-7A6F2501B303}" type="datetime8">
               <a:rPr lang="en-US" smtClean="0"/>
-              <a:t>9/17/18 8:54 PM</a:t>
+              <a:t>12/12/18 2:15 PM</a:t>
             </a:fld>
             <a:endParaRPr lang="en-US" dirty="0"/>
           </a:p>
@@ -2900,7 +2900,7 @@
                 <a:tabLst/>
                 <a:defRPr/>
               </a:pPr>
-              <a:t>9/17/18 8:54 PM</a:t>
+              <a:t>12/12/18 2:15 PM</a:t>
             </a:fld>
             <a:endParaRPr kumimoji="0" lang="en-US" sz="1200" b="0" i="0" u="none" strike="noStrike" kern="1200" cap="none" spc="0" normalizeH="0" baseline="0" noProof="0" dirty="0">
               <a:ln>
@@ -3169,7 +3169,7 @@
           <a:p>
             <a:fld id="{D18B56EA-E28F-4F92-9F16-7A6F2501B303}" type="datetime8">
               <a:rPr lang="en-US" smtClean="0"/>
-              <a:t>9/17/18 8:54 PM</a:t>
+              <a:t>12/12/18 2:15 PM</a:t>
             </a:fld>
             <a:endParaRPr lang="en-US" dirty="0"/>
           </a:p>
@@ -3374,7 +3374,7 @@
           <a:p>
             <a:fld id="{D18B56EA-E28F-4F92-9F16-7A6F2501B303}" type="datetime8">
               <a:rPr lang="en-US" smtClean="0"/>
-              <a:t>9/17/18 8:54 PM</a:t>
+              <a:t>12/12/18 2:15 PM</a:t>
             </a:fld>
             <a:endParaRPr lang="en-US" dirty="0"/>
           </a:p>
@@ -3642,7 +3642,7 @@
           <a:p>
             <a:fld id="{D18B56EA-E28F-4F92-9F16-7A6F2501B303}" type="datetime8">
               <a:rPr lang="en-US" smtClean="0"/>
-              <a:t>9/17/18 8:54 PM</a:t>
+              <a:t>12/12/18 2:15 PM</a:t>
             </a:fld>
             <a:endParaRPr lang="en-US" dirty="0"/>
           </a:p>
@@ -3865,7 +3865,7 @@
           <a:p>
             <a:fld id="{D18B56EA-E28F-4F92-9F16-7A6F2501B303}" type="datetime8">
               <a:rPr lang="en-US" smtClean="0"/>
-              <a:t>9/17/18 8:54 PM</a:t>
+              <a:t>12/12/18 2:15 PM</a:t>
             </a:fld>
             <a:endParaRPr lang="en-US" dirty="0"/>
           </a:p>
@@ -4098,7 +4098,7 @@
           <a:p>
             <a:fld id="{D18B56EA-E28F-4F92-9F16-7A6F2501B303}" type="datetime8">
               <a:rPr lang="en-US" smtClean="0"/>
-              <a:t>9/17/18 8:54 PM</a:t>
+              <a:t>12/12/18 2:15 PM</a:t>
             </a:fld>
             <a:endParaRPr lang="en-US" dirty="0"/>
           </a:p>
@@ -4295,7 +4295,7 @@
           <a:p>
             <a:fld id="{D18B56EA-E28F-4F92-9F16-7A6F2501B303}" type="datetime8">
               <a:rPr lang="en-US" smtClean="0"/>
-              <a:t>9/17/18 8:54 PM</a:t>
+              <a:t>12/12/18 2:15 PM</a:t>
             </a:fld>
             <a:endParaRPr lang="en-US" dirty="0"/>
           </a:p>
@@ -4496,7 +4496,7 @@
           <a:p>
             <a:fld id="{D18B56EA-E28F-4F92-9F16-7A6F2501B303}" type="datetime8">
               <a:rPr lang="en-US" smtClean="0"/>
-              <a:t>9/17/18 8:54 PM</a:t>
+              <a:t>12/12/18 2:15 PM</a:t>
             </a:fld>
             <a:endParaRPr lang="en-US" dirty="0"/>
           </a:p>
@@ -20148,7 +20148,7 @@
         <p:spPr>
           <a:xfrm>
             <a:off x="465138" y="1813220"/>
-            <a:ext cx="5095403" cy="4456605"/>
+            <a:ext cx="5095403" cy="5053691"/>
           </a:xfrm>
         </p:spPr>
         <p:txBody>
@@ -20181,7 +20181,7 @@
             </a:pPr>
             <a:r>
               <a:rPr lang="en-US" sz="1600" dirty="0"/>
-              <a:t>Use the Office Yeoman generator Angular template OR…</a:t>
+              <a:t>Use the Office Yeoman generator Angular template</a:t>
             </a:r>
           </a:p>
           <a:p>
@@ -20189,6 +20189,17 @@
               <a:lnSpc>
                 <a:spcPct val="90000"/>
               </a:lnSpc>
+              <a:spcBef>
+                <a:spcPts val="1200"/>
+              </a:spcBef>
+            </a:pPr>
+            <a:r>
+              <a:rPr lang="en-US" sz="1600" dirty="0"/>
+              <a:t>Alternatively if you want more control of structure:</a:t>
+            </a:r>
+          </a:p>
+          <a:p>
+            <a:pPr lvl="2">
               <a:spcBef>
                 <a:spcPts val="1200"/>
               </a:spcBef>
@@ -20206,10 +20217,7 @@
             </a:r>
           </a:p>
           <a:p>
-            <a:pPr lvl="1">
-              <a:lnSpc>
-                <a:spcPct val="90000"/>
-              </a:lnSpc>
+            <a:pPr lvl="2">
               <a:spcBef>
                 <a:spcPts val="1200"/>
               </a:spcBef>
@@ -20227,10 +20235,7 @@
             </a:r>
           </a:p>
           <a:p>
-            <a:pPr lvl="1">
-              <a:lnSpc>
-                <a:spcPct val="90000"/>
-              </a:lnSpc>
+            <a:pPr lvl="2">
               <a:spcBef>
                 <a:spcPts val="1200"/>
               </a:spcBef>
@@ -20254,10 +20259,7 @@
             <a:endParaRPr lang="en-US" sz="1600" dirty="0"/>
           </a:p>
           <a:p>
-            <a:pPr lvl="1">
-              <a:lnSpc>
-                <a:spcPct val="90000"/>
-              </a:lnSpc>
+            <a:pPr lvl="2">
               <a:spcBef>
                 <a:spcPts val="1200"/>
               </a:spcBef>
@@ -20276,10 +20278,7 @@
             </a:r>
           </a:p>
           <a:p>
-            <a:pPr lvl="1">
-              <a:lnSpc>
-                <a:spcPct val="90000"/>
-              </a:lnSpc>
+            <a:pPr lvl="2">
               <a:spcBef>
                 <a:spcPts val="1200"/>
               </a:spcBef>
@@ -20303,10 +20302,7 @@
             <a:endParaRPr lang="en-US" sz="1600" dirty="0"/>
           </a:p>
           <a:p>
-            <a:pPr lvl="1">
-              <a:lnSpc>
-                <a:spcPct val="90000"/>
-              </a:lnSpc>
+            <a:pPr lvl="2">
               <a:spcBef>
                 <a:spcPts val="1200"/>
               </a:spcBef>
@@ -20323,6 +20319,7 @@
               <a:rPr lang="en-US" sz="1600" dirty="0"/>
               <a:t> config)</a:t>
             </a:r>
+            <a:endParaRPr lang="en-US" sz="2600" dirty="0"/>
           </a:p>
         </p:txBody>
       </p:sp>

</xml_diff>